<commit_message>
Update: save_ppt - slide resolution
</commit_message>
<xml_diff>
--- a/experiment/detect_handwrite/test.pptx
+++ b/experiment/detect_handwrite/test.pptx
@@ -17,7 +17,7 @@
     <p:sldId id="265" r:id="rId16"/>
     <p:sldId id="266" r:id="rId17"/>
   </p:sldIdLst>
-  <p:sldSz cx="9144000" cy="6858000" type="screen4x3"/>
+  <p:sldSz cx="14630400" cy="8252460" type="screen4x3"/>
   <p:notesSz cx="6858000" cy="9144000"/>
   <p:defaultTextStyle>
     <a:defPPr>
@@ -3115,7 +3115,7 @@
         <p:spPr>
           <a:xfrm>
             <a:off x="0" y="0"/>
-            <a:ext cx="9144000" cy="5143500"/>
+            <a:ext cx="14630400" cy="8252460"/>
           </a:xfrm>
           <a:prstGeom prst="rect">
             <a:avLst/>
@@ -3157,7 +3157,7 @@
         <p:spPr>
           <a:xfrm>
             <a:off x="0" y="0"/>
-            <a:ext cx="9144000" cy="5143500"/>
+            <a:ext cx="14630400" cy="8252460"/>
           </a:xfrm>
           <a:prstGeom prst="rect">
             <a:avLst/>
@@ -3199,7 +3199,7 @@
         <p:spPr>
           <a:xfrm>
             <a:off x="0" y="0"/>
-            <a:ext cx="9144000" cy="5143500"/>
+            <a:ext cx="14630400" cy="8252460"/>
           </a:xfrm>
           <a:prstGeom prst="rect">
             <a:avLst/>
@@ -3241,7 +3241,7 @@
         <p:spPr>
           <a:xfrm>
             <a:off x="0" y="0"/>
-            <a:ext cx="9144000" cy="5143500"/>
+            <a:ext cx="14630400" cy="8252460"/>
           </a:xfrm>
           <a:prstGeom prst="rect">
             <a:avLst/>
@@ -3283,7 +3283,7 @@
         <p:spPr>
           <a:xfrm>
             <a:off x="0" y="0"/>
-            <a:ext cx="9144000" cy="5143500"/>
+            <a:ext cx="14630400" cy="8252460"/>
           </a:xfrm>
           <a:prstGeom prst="rect">
             <a:avLst/>
@@ -3325,7 +3325,7 @@
         <p:spPr>
           <a:xfrm>
             <a:off x="0" y="0"/>
-            <a:ext cx="9144000" cy="5143500"/>
+            <a:ext cx="14630400" cy="8252460"/>
           </a:xfrm>
           <a:prstGeom prst="rect">
             <a:avLst/>
@@ -3367,7 +3367,7 @@
         <p:spPr>
           <a:xfrm>
             <a:off x="0" y="0"/>
-            <a:ext cx="9144000" cy="5143500"/>
+            <a:ext cx="14630400" cy="8252460"/>
           </a:xfrm>
           <a:prstGeom prst="rect">
             <a:avLst/>
@@ -3409,7 +3409,7 @@
         <p:spPr>
           <a:xfrm>
             <a:off x="0" y="0"/>
-            <a:ext cx="9144000" cy="5143500"/>
+            <a:ext cx="14630400" cy="8252460"/>
           </a:xfrm>
           <a:prstGeom prst="rect">
             <a:avLst/>
@@ -3451,7 +3451,7 @@
         <p:spPr>
           <a:xfrm>
             <a:off x="0" y="0"/>
-            <a:ext cx="9144000" cy="5143500"/>
+            <a:ext cx="14630400" cy="8252460"/>
           </a:xfrm>
           <a:prstGeom prst="rect">
             <a:avLst/>
@@ -3493,7 +3493,7 @@
         <p:spPr>
           <a:xfrm>
             <a:off x="0" y="0"/>
-            <a:ext cx="9144000" cy="5143500"/>
+            <a:ext cx="14630400" cy="8252460"/>
           </a:xfrm>
           <a:prstGeom prst="rect">
             <a:avLst/>
@@ -3535,7 +3535,7 @@
         <p:spPr>
           <a:xfrm>
             <a:off x="0" y="0"/>
-            <a:ext cx="9144000" cy="5143500"/>
+            <a:ext cx="14630400" cy="8252460"/>
           </a:xfrm>
           <a:prstGeom prst="rect">
             <a:avLst/>

</xml_diff>